<commit_message>
Pridaj link na beginner project do prezentacie
</commit_message>
<xml_diff>
--- a/Git 2.pptx
+++ b/Git 2.pptx
@@ -7013,7 +7013,7 @@
         </p:spPr>
         <p:txBody>
           <a:bodyPr>
-            <a:normAutofit lnSpcReduction="10000"/>
+            <a:normAutofit fontScale="92500" lnSpcReduction="20000"/>
           </a:bodyPr>
           <a:lstStyle/>
           <a:p>
@@ -7119,6 +7119,18 @@
               </a:rPr>
               <a:t>https://www.toptal.com/software/trunk-based-development-git-flow</a:t>
             </a:r>
+            <a:endParaRPr lang="en-GB" dirty="0"/>
+          </a:p>
+          <a:p>
+            <a:r>
+              <a:rPr lang="sk-SK" dirty="0">
+                <a:hlinkClick r:id="rId8"/>
+              </a:rPr>
+              <a:t>https://github.com/MunGell/awesome-for-beginners</a:t>
+            </a:r>
+            <a:endParaRPr lang="en-GB" dirty="0"/>
+          </a:p>
+          <a:p>
             <a:endParaRPr lang="sk-SK" dirty="0"/>
           </a:p>
           <a:p>

</xml_diff>